<commit_message>
final version the second presentation
</commit_message>
<xml_diff>
--- a/Praca/Seminarium/seminarium_prez2.pptx
+++ b/Praca/Seminarium/seminarium_prez2.pptx
@@ -7,22 +7,15 @@
   <p:sldIdLst>
     <p:sldId id="256" r:id="rId2"/>
     <p:sldId id="257" r:id="rId3"/>
-    <p:sldId id="258" r:id="rId4"/>
-    <p:sldId id="268" r:id="rId5"/>
-    <p:sldId id="270" r:id="rId6"/>
-    <p:sldId id="271" r:id="rId7"/>
-    <p:sldId id="269" r:id="rId8"/>
-    <p:sldId id="259" r:id="rId9"/>
-    <p:sldId id="275" r:id="rId10"/>
-    <p:sldId id="276" r:id="rId11"/>
-    <p:sldId id="279" r:id="rId12"/>
-    <p:sldId id="280" r:id="rId13"/>
-    <p:sldId id="281" r:id="rId14"/>
-    <p:sldId id="282" r:id="rId15"/>
-    <p:sldId id="261" r:id="rId16"/>
-    <p:sldId id="278" r:id="rId17"/>
-    <p:sldId id="283" r:id="rId18"/>
-    <p:sldId id="277" r:id="rId19"/>
+    <p:sldId id="279" r:id="rId4"/>
+    <p:sldId id="280" r:id="rId5"/>
+    <p:sldId id="281" r:id="rId6"/>
+    <p:sldId id="261" r:id="rId7"/>
+    <p:sldId id="284" r:id="rId8"/>
+    <p:sldId id="282" r:id="rId9"/>
+    <p:sldId id="283" r:id="rId10"/>
+    <p:sldId id="278" r:id="rId11"/>
+    <p:sldId id="277" r:id="rId12"/>
   </p:sldIdLst>
   <p:sldSz cx="9144000" cy="6858000" type="screen4x3"/>
   <p:notesSz cx="6858000" cy="9144000"/>
@@ -321,7 +314,7 @@
           <a:p>
             <a:fld id="{1AC32706-72C9-43E7-8E0A-734A3277496A}" type="datetimeFigureOut">
               <a:rPr lang="pl-PL" smtClean="0"/>
-              <a:t>2016-05-16</a:t>
+              <a:t>2016-05-17</a:t>
             </a:fld>
             <a:endParaRPr lang="pl-PL"/>
           </a:p>
@@ -491,7 +484,7 @@
           <a:p>
             <a:fld id="{1AC32706-72C9-43E7-8E0A-734A3277496A}" type="datetimeFigureOut">
               <a:rPr lang="pl-PL" smtClean="0"/>
-              <a:t>2016-05-16</a:t>
+              <a:t>2016-05-17</a:t>
             </a:fld>
             <a:endParaRPr lang="pl-PL"/>
           </a:p>
@@ -671,7 +664,7 @@
           <a:p>
             <a:fld id="{1AC32706-72C9-43E7-8E0A-734A3277496A}" type="datetimeFigureOut">
               <a:rPr lang="pl-PL" smtClean="0"/>
-              <a:t>2016-05-16</a:t>
+              <a:t>2016-05-17</a:t>
             </a:fld>
             <a:endParaRPr lang="pl-PL"/>
           </a:p>
@@ -841,7 +834,7 @@
           <a:p>
             <a:fld id="{1AC32706-72C9-43E7-8E0A-734A3277496A}" type="datetimeFigureOut">
               <a:rPr lang="pl-PL" smtClean="0"/>
-              <a:t>2016-05-16</a:t>
+              <a:t>2016-05-17</a:t>
             </a:fld>
             <a:endParaRPr lang="pl-PL"/>
           </a:p>
@@ -1087,7 +1080,7 @@
           <a:p>
             <a:fld id="{1AC32706-72C9-43E7-8E0A-734A3277496A}" type="datetimeFigureOut">
               <a:rPr lang="pl-PL" smtClean="0"/>
-              <a:t>2016-05-16</a:t>
+              <a:t>2016-05-17</a:t>
             </a:fld>
             <a:endParaRPr lang="pl-PL"/>
           </a:p>
@@ -1375,7 +1368,7 @@
           <a:p>
             <a:fld id="{1AC32706-72C9-43E7-8E0A-734A3277496A}" type="datetimeFigureOut">
               <a:rPr lang="pl-PL" smtClean="0"/>
-              <a:t>2016-05-16</a:t>
+              <a:t>2016-05-17</a:t>
             </a:fld>
             <a:endParaRPr lang="pl-PL"/>
           </a:p>
@@ -1797,7 +1790,7 @@
           <a:p>
             <a:fld id="{1AC32706-72C9-43E7-8E0A-734A3277496A}" type="datetimeFigureOut">
               <a:rPr lang="pl-PL" smtClean="0"/>
-              <a:t>2016-05-16</a:t>
+              <a:t>2016-05-17</a:t>
             </a:fld>
             <a:endParaRPr lang="pl-PL"/>
           </a:p>
@@ -1915,7 +1908,7 @@
           <a:p>
             <a:fld id="{1AC32706-72C9-43E7-8E0A-734A3277496A}" type="datetimeFigureOut">
               <a:rPr lang="pl-PL" smtClean="0"/>
-              <a:t>2016-05-16</a:t>
+              <a:t>2016-05-17</a:t>
             </a:fld>
             <a:endParaRPr lang="pl-PL"/>
           </a:p>
@@ -2010,7 +2003,7 @@
           <a:p>
             <a:fld id="{1AC32706-72C9-43E7-8E0A-734A3277496A}" type="datetimeFigureOut">
               <a:rPr lang="pl-PL" smtClean="0"/>
-              <a:t>2016-05-16</a:t>
+              <a:t>2016-05-17</a:t>
             </a:fld>
             <a:endParaRPr lang="pl-PL"/>
           </a:p>
@@ -2287,7 +2280,7 @@
           <a:p>
             <a:fld id="{1AC32706-72C9-43E7-8E0A-734A3277496A}" type="datetimeFigureOut">
               <a:rPr lang="pl-PL" smtClean="0"/>
-              <a:t>2016-05-16</a:t>
+              <a:t>2016-05-17</a:t>
             </a:fld>
             <a:endParaRPr lang="pl-PL"/>
           </a:p>
@@ -2540,7 +2533,7 @@
           <a:p>
             <a:fld id="{1AC32706-72C9-43E7-8E0A-734A3277496A}" type="datetimeFigureOut">
               <a:rPr lang="pl-PL" smtClean="0"/>
-              <a:t>2016-05-16</a:t>
+              <a:t>2016-05-17</a:t>
             </a:fld>
             <a:endParaRPr lang="pl-PL"/>
           </a:p>
@@ -2756,7 +2749,7 @@
           <a:p>
             <a:fld id="{1AC32706-72C9-43E7-8E0A-734A3277496A}" type="datetimeFigureOut">
               <a:rPr lang="pl-PL" smtClean="0"/>
-              <a:t>2016-05-16</a:t>
+              <a:t>2016-05-17</a:t>
             </a:fld>
             <a:endParaRPr lang="pl-PL"/>
           </a:p>
@@ -3232,58 +3225,91 @@
         <p:spPr/>
         <p:txBody>
           <a:bodyPr>
+            <a:normAutofit fontScale="90000"/>
+          </a:bodyPr>
+          <a:lstStyle/>
+          <a:p>
+            <a:r>
+              <a:rPr lang="pl-PL" dirty="0" smtClean="0"/>
+              <a:t>Wykorzystane środowiska i technologie</a:t>
+            </a:r>
+            <a:endParaRPr lang="pl-PL" dirty="0"/>
+          </a:p>
+        </p:txBody>
+      </p:sp>
+      <p:sp>
+        <p:nvSpPr>
+          <p:cNvPr id="3" name="Symbol zastępczy zawartości 2"/>
+          <p:cNvSpPr>
+            <a:spLocks noGrp="1"/>
+          </p:cNvSpPr>
+          <p:nvPr>
+            <p:ph idx="1"/>
+          </p:nvPr>
+        </p:nvSpPr>
+        <p:spPr/>
+        <p:txBody>
+          <a:bodyPr>
             <a:normAutofit/>
           </a:bodyPr>
           <a:lstStyle/>
           <a:p>
-            <a:r>
-              <a:rPr lang="pl-PL" dirty="0" smtClean="0"/>
-              <a:t>Zastosowanie ciągu Sturma</a:t>
-            </a:r>
-            <a:endParaRPr lang="pl-PL" dirty="0"/>
-          </a:p>
-        </p:txBody>
-      </p:sp>
-      <p:sp>
-        <p:nvSpPr>
-          <p:cNvPr id="3" name="Symbol zastępczy zawartości 2"/>
-          <p:cNvSpPr>
-            <a:spLocks noGrp="1"/>
-          </p:cNvSpPr>
-          <p:nvPr>
-            <p:ph idx="1"/>
-          </p:nvPr>
-        </p:nvSpPr>
-        <p:spPr/>
-        <p:txBody>
-          <a:bodyPr>
-            <a:normAutofit lnSpcReduction="10000"/>
-          </a:bodyPr>
-          <a:lstStyle/>
-          <a:p>
-            <a:r>
-              <a:rPr lang="pl-PL" dirty="0" smtClean="0"/>
-              <a:t>Eliminacja pierwiastków wielokrotnych poprzez podzielenie wielomianu W przez NWD(W, W’)</a:t>
-            </a:r>
-          </a:p>
-          <a:p>
-            <a:r>
-              <a:rPr lang="pl-PL" dirty="0" smtClean="0"/>
-              <a:t>Pozwala na znalezienie wszystkich pierwiastków rzeczywistych w zadanym przedziale z dowolną dokładnością</a:t>
-            </a:r>
-          </a:p>
-          <a:p>
-            <a:r>
-              <a:rPr lang="pl-PL" dirty="0" smtClean="0"/>
-              <a:t>Ważna jest liczba zmian znaku dla wartości wielomianów, będących kolejnymi elementami ciągu Sturma</a:t>
-            </a:r>
+            <a:pPr>
+              <a:buFontTx/>
+              <a:buChar char="-"/>
+            </a:pPr>
+            <a:r>
+              <a:rPr lang="pl-PL" sz="2800" dirty="0" smtClean="0"/>
+              <a:t>Język programowania: C++</a:t>
+            </a:r>
+          </a:p>
+          <a:p>
+            <a:pPr>
+              <a:buFontTx/>
+              <a:buChar char="-"/>
+            </a:pPr>
+            <a:r>
+              <a:rPr lang="pl-PL" sz="2800" dirty="0" smtClean="0"/>
+              <a:t>Visual Studio 2015:</a:t>
+            </a:r>
+          </a:p>
+          <a:p>
+            <a:pPr>
+              <a:buFontTx/>
+              <a:buChar char="-"/>
+            </a:pPr>
+            <a:r>
+              <a:rPr lang="pl-PL" sz="2800" dirty="0" smtClean="0"/>
+              <a:t>Podział na trzy projekty (moduły) w ramach jednej solucji (biblioteka + aplikacja + unit testy) </a:t>
+            </a:r>
+          </a:p>
+          <a:p>
+            <a:pPr>
+              <a:buFontTx/>
+              <a:buChar char="-"/>
+            </a:pPr>
+            <a:r>
+              <a:rPr lang="pl-PL" sz="2800" dirty="0" smtClean="0"/>
+              <a:t>Git (git extension)</a:t>
+            </a:r>
+          </a:p>
+          <a:p>
+            <a:pPr>
+              <a:buFontTx/>
+              <a:buChar char="-"/>
+            </a:pPr>
+            <a:r>
+              <a:rPr lang="pl-PL" sz="2800" dirty="0" smtClean="0"/>
+              <a:t>Kod na githubie</a:t>
+            </a:r>
+            <a:endParaRPr lang="pl-PL" sz="2800" dirty="0"/>
           </a:p>
         </p:txBody>
       </p:sp>
     </p:spTree>
     <p:extLst>
       <p:ext uri="{BB962C8B-B14F-4D97-AF65-F5344CB8AC3E}">
-        <p14:creationId xmlns:p14="http://schemas.microsoft.com/office/powerpoint/2010/main" val="1748356265"/>
+        <p14:creationId xmlns:p14="http://schemas.microsoft.com/office/powerpoint/2010/main" val="1145578772"/>
       </p:ext>
     </p:extLst>
   </p:cSld>
@@ -3329,886 +3355,6 @@
           <a:p>
             <a:r>
               <a:rPr lang="pl-PL" dirty="0" smtClean="0"/>
-              <a:t>Przyjęte rozwiązanie</a:t>
-            </a:r>
-            <a:endParaRPr lang="pl-PL" dirty="0"/>
-          </a:p>
-        </p:txBody>
-      </p:sp>
-      <p:sp>
-        <p:nvSpPr>
-          <p:cNvPr id="3" name="Symbol zastępczy zawartości 2"/>
-          <p:cNvSpPr>
-            <a:spLocks noGrp="1"/>
-          </p:cNvSpPr>
-          <p:nvPr>
-            <p:ph idx="1"/>
-          </p:nvPr>
-        </p:nvSpPr>
-        <p:spPr/>
-        <p:txBody>
-          <a:bodyPr>
-            <a:normAutofit fontScale="92500"/>
-          </a:bodyPr>
-          <a:lstStyle/>
-          <a:p>
-            <a:r>
-              <a:rPr lang="pl-PL" dirty="0" smtClean="0"/>
-              <a:t>Implemetancja w C++</a:t>
-            </a:r>
-          </a:p>
-          <a:p>
-            <a:r>
-              <a:rPr lang="pl-PL" dirty="0" smtClean="0"/>
-              <a:t>Konsola jako interfejs aplikacji, umożliwiający wprowadzania danych wejściowych</a:t>
-            </a:r>
-            <a:endParaRPr lang="pl-PL" dirty="0"/>
-          </a:p>
-          <a:p>
-            <a:r>
-              <a:rPr lang="pl-PL" dirty="0" smtClean="0"/>
-              <a:t>Testy jednostkowe, napisane z użyciem frameworka wbudowanego w Visual Studio 2015</a:t>
-            </a:r>
-          </a:p>
-          <a:p>
-            <a:r>
-              <a:rPr lang="pl-PL" dirty="0" smtClean="0"/>
-              <a:t>Podział funkcjonalności na klasy</a:t>
-            </a:r>
-          </a:p>
-          <a:p>
-            <a:r>
-              <a:rPr lang="pl-PL" dirty="0" smtClean="0"/>
-              <a:t>Struktury wielomianu posiadający wspólną klasę bazową i implementujące jej metody abstrakcyjne</a:t>
-            </a:r>
-          </a:p>
-          <a:p>
-            <a:endParaRPr lang="pl-PL" dirty="0" smtClean="0"/>
-          </a:p>
-        </p:txBody>
-      </p:sp>
-    </p:spTree>
-    <p:extLst>
-      <p:ext uri="{BB962C8B-B14F-4D97-AF65-F5344CB8AC3E}">
-        <p14:creationId xmlns:p14="http://schemas.microsoft.com/office/powerpoint/2010/main" val="3586097633"/>
-      </p:ext>
-    </p:extLst>
-  </p:cSld>
-  <p:clrMapOvr>
-    <a:masterClrMapping/>
-  </p:clrMapOvr>
-</p:sld>
-</file>
-
-<file path=ppt/slides/slide12.xml><?xml version="1.0" encoding="utf-8"?>
-<p:sld xmlns:a="http://schemas.openxmlformats.org/drawingml/2006/main" xmlns:r="http://schemas.openxmlformats.org/officeDocument/2006/relationships" xmlns:p="http://schemas.openxmlformats.org/presentationml/2006/main">
-  <p:cSld>
-    <p:spTree>
-      <p:nvGrpSpPr>
-        <p:cNvPr id="1" name=""/>
-        <p:cNvGrpSpPr/>
-        <p:nvPr/>
-      </p:nvGrpSpPr>
-      <p:grpSpPr>
-        <a:xfrm>
-          <a:off x="0" y="0"/>
-          <a:ext cx="0" cy="0"/>
-          <a:chOff x="0" y="0"/>
-          <a:chExt cx="0" cy="0"/>
-        </a:xfrm>
-      </p:grpSpPr>
-      <p:sp>
-        <p:nvSpPr>
-          <p:cNvPr id="2" name="Tytuł 1"/>
-          <p:cNvSpPr>
-            <a:spLocks noGrp="1"/>
-          </p:cNvSpPr>
-          <p:nvPr>
-            <p:ph type="title"/>
-          </p:nvPr>
-        </p:nvSpPr>
-        <p:spPr/>
-        <p:txBody>
-          <a:bodyPr>
-            <a:normAutofit/>
-          </a:bodyPr>
-          <a:lstStyle/>
-          <a:p>
-            <a:r>
-              <a:rPr lang="pl-PL" dirty="0" smtClean="0"/>
-              <a:t>Podział na klasy</a:t>
-            </a:r>
-            <a:endParaRPr lang="pl-PL" dirty="0"/>
-          </a:p>
-        </p:txBody>
-      </p:sp>
-      <p:sp>
-        <p:nvSpPr>
-          <p:cNvPr id="3" name="Symbol zastępczy zawartości 2"/>
-          <p:cNvSpPr>
-            <a:spLocks noGrp="1"/>
-          </p:cNvSpPr>
-          <p:nvPr>
-            <p:ph idx="1"/>
-          </p:nvPr>
-        </p:nvSpPr>
-        <p:spPr>
-          <a:xfrm>
-            <a:off x="457200" y="1600201"/>
-            <a:ext cx="7715200" cy="4421088"/>
-          </a:xfrm>
-        </p:spPr>
-        <p:txBody>
-          <a:bodyPr>
-            <a:normAutofit fontScale="85000" lnSpcReduction="20000"/>
-          </a:bodyPr>
-          <a:lstStyle/>
-          <a:p>
-            <a:r>
-              <a:rPr lang="pl-PL" dirty="0" smtClean="0"/>
-              <a:t>CharsConstant i StringManager - klasy zarządzające znakami i łańcuchami znaków</a:t>
-            </a:r>
-          </a:p>
-          <a:p>
-            <a:r>
-              <a:rPr lang="pl-PL" dirty="0" smtClean="0"/>
-              <a:t>Number – klasa zarządzająca długimi liczbami</a:t>
-            </a:r>
-          </a:p>
-          <a:p>
-            <a:r>
-              <a:rPr lang="pl-PL" dirty="0" smtClean="0"/>
-              <a:t>Parser – klasa tworząca strukturę wielomianu ze strumienia wejściowego</a:t>
-            </a:r>
-          </a:p>
-          <a:p>
-            <a:r>
-              <a:rPr lang="pl-PL" dirty="0" smtClean="0"/>
-              <a:t>Polynomial – klasa abstrakcyjna reprezentująca wielomian</a:t>
-            </a:r>
-          </a:p>
-          <a:p>
-            <a:r>
-              <a:rPr lang="pl-PL" dirty="0" smtClean="0"/>
-              <a:t>PolynomialMap – klasa reprezentująca wielomian w postaci mapy</a:t>
-            </a:r>
-          </a:p>
-          <a:p>
-            <a:r>
-              <a:rPr lang="pl-PL" dirty="0" smtClean="0"/>
-              <a:t>PolynomialVector – klasa reprezentująca wielomian w postaci tablicy</a:t>
-            </a:r>
-          </a:p>
-        </p:txBody>
-      </p:sp>
-    </p:spTree>
-    <p:extLst>
-      <p:ext uri="{BB962C8B-B14F-4D97-AF65-F5344CB8AC3E}">
-        <p14:creationId xmlns:p14="http://schemas.microsoft.com/office/powerpoint/2010/main" val="1962515182"/>
-      </p:ext>
-    </p:extLst>
-  </p:cSld>
-  <p:clrMapOvr>
-    <a:masterClrMapping/>
-  </p:clrMapOvr>
-</p:sld>
-</file>
-
-<file path=ppt/slides/slide13.xml><?xml version="1.0" encoding="utf-8"?>
-<p:sld xmlns:a="http://schemas.openxmlformats.org/drawingml/2006/main" xmlns:r="http://schemas.openxmlformats.org/officeDocument/2006/relationships" xmlns:p="http://schemas.openxmlformats.org/presentationml/2006/main">
-  <p:cSld>
-    <p:spTree>
-      <p:nvGrpSpPr>
-        <p:cNvPr id="1" name=""/>
-        <p:cNvGrpSpPr/>
-        <p:nvPr/>
-      </p:nvGrpSpPr>
-      <p:grpSpPr>
-        <a:xfrm>
-          <a:off x="0" y="0"/>
-          <a:ext cx="0" cy="0"/>
-          <a:chOff x="0" y="0"/>
-          <a:chExt cx="0" cy="0"/>
-        </a:xfrm>
-      </p:grpSpPr>
-      <p:sp>
-        <p:nvSpPr>
-          <p:cNvPr id="2" name="Tytuł 1"/>
-          <p:cNvSpPr>
-            <a:spLocks noGrp="1"/>
-          </p:cNvSpPr>
-          <p:nvPr>
-            <p:ph type="title"/>
-          </p:nvPr>
-        </p:nvSpPr>
-        <p:spPr/>
-        <p:txBody>
-          <a:bodyPr>
-            <a:normAutofit/>
-          </a:bodyPr>
-          <a:lstStyle/>
-          <a:p>
-            <a:r>
-              <a:rPr lang="pl-PL" dirty="0" smtClean="0"/>
-              <a:t>Główne funkcje</a:t>
-            </a:r>
-            <a:endParaRPr lang="pl-PL" dirty="0"/>
-          </a:p>
-        </p:txBody>
-      </p:sp>
-      <p:sp>
-        <p:nvSpPr>
-          <p:cNvPr id="3" name="Symbol zastępczy zawartości 2"/>
-          <p:cNvSpPr>
-            <a:spLocks noGrp="1"/>
-          </p:cNvSpPr>
-          <p:nvPr>
-            <p:ph idx="1"/>
-          </p:nvPr>
-        </p:nvSpPr>
-        <p:spPr>
-          <a:xfrm>
-            <a:off x="251520" y="1600201"/>
-            <a:ext cx="8784976" cy="4421088"/>
-          </a:xfrm>
-        </p:spPr>
-        <p:txBody>
-          <a:bodyPr>
-            <a:normAutofit fontScale="85000" lnSpcReduction="20000"/>
-          </a:bodyPr>
-          <a:lstStyle/>
-          <a:p>
-            <a:r>
-              <a:rPr lang="pl-PL" dirty="0" smtClean="0"/>
-              <a:t>Podstawowe operacje na wielomianach: dodawanie, odejmowanie, mnożenie, dzielenie, modulo, potęgowanie</a:t>
-            </a:r>
-          </a:p>
-          <a:p>
-            <a:r>
-              <a:rPr lang="pl-PL" dirty="0" smtClean="0"/>
-              <a:t>Porównywanie wielomianu</a:t>
-            </a:r>
-          </a:p>
-          <a:p>
-            <a:r>
-              <a:rPr lang="pl-PL" dirty="0" smtClean="0"/>
-              <a:t>Obliczanie wartości wielomianu</a:t>
-            </a:r>
-          </a:p>
-          <a:p>
-            <a:r>
-              <a:rPr lang="pl-PL" dirty="0" smtClean="0"/>
-              <a:t>Obliczanie pochodnej wielomianu</a:t>
-            </a:r>
-          </a:p>
-          <a:p>
-            <a:r>
-              <a:rPr lang="pl-PL" dirty="0" smtClean="0"/>
-              <a:t>Oliczanie NWD wielomianów</a:t>
-            </a:r>
-          </a:p>
-          <a:p>
-            <a:r>
-              <a:rPr lang="pl-PL" dirty="0" smtClean="0"/>
-              <a:t>Obliczanie liczby pierwiastków w zadanym przedziale</a:t>
-            </a:r>
-          </a:p>
-          <a:p>
-            <a:r>
-              <a:rPr lang="pl-PL" dirty="0" smtClean="0"/>
-              <a:t>Eliminacja pierwiastków wielokrotnych</a:t>
-            </a:r>
-          </a:p>
-          <a:p>
-            <a:r>
-              <a:rPr lang="pl-PL" dirty="0" smtClean="0"/>
-              <a:t>Obliczanie wyrazów ciągu Sturma</a:t>
-            </a:r>
-          </a:p>
-          <a:p>
-            <a:r>
-              <a:rPr lang="pl-PL" dirty="0" smtClean="0"/>
-              <a:t>Obliczanie pierwiastków w zadanym przedziale</a:t>
-            </a:r>
-          </a:p>
-          <a:p>
-            <a:endParaRPr lang="pl-PL" dirty="0" smtClean="0"/>
-          </a:p>
-        </p:txBody>
-      </p:sp>
-    </p:spTree>
-    <p:extLst>
-      <p:ext uri="{BB962C8B-B14F-4D97-AF65-F5344CB8AC3E}">
-        <p14:creationId xmlns:p14="http://schemas.microsoft.com/office/powerpoint/2010/main" val="4095873739"/>
-      </p:ext>
-    </p:extLst>
-  </p:cSld>
-  <p:clrMapOvr>
-    <a:masterClrMapping/>
-  </p:clrMapOvr>
-</p:sld>
-</file>
-
-<file path=ppt/slides/slide14.xml><?xml version="1.0" encoding="utf-8"?>
-<p:sld xmlns:a="http://schemas.openxmlformats.org/drawingml/2006/main" xmlns:r="http://schemas.openxmlformats.org/officeDocument/2006/relationships" xmlns:p="http://schemas.openxmlformats.org/presentationml/2006/main">
-  <p:cSld>
-    <p:spTree>
-      <p:nvGrpSpPr>
-        <p:cNvPr id="1" name=""/>
-        <p:cNvGrpSpPr/>
-        <p:nvPr/>
-      </p:nvGrpSpPr>
-      <p:grpSpPr>
-        <a:xfrm>
-          <a:off x="0" y="0"/>
-          <a:ext cx="0" cy="0"/>
-          <a:chOff x="0" y="0"/>
-          <a:chExt cx="0" cy="0"/>
-        </a:xfrm>
-      </p:grpSpPr>
-      <p:sp>
-        <p:nvSpPr>
-          <p:cNvPr id="2" name="Tytuł 1"/>
-          <p:cNvSpPr>
-            <a:spLocks noGrp="1"/>
-          </p:cNvSpPr>
-          <p:nvPr>
-            <p:ph type="title"/>
-          </p:nvPr>
-        </p:nvSpPr>
-        <p:spPr/>
-        <p:txBody>
-          <a:bodyPr>
-            <a:normAutofit/>
-          </a:bodyPr>
-          <a:lstStyle/>
-          <a:p>
-            <a:r>
-              <a:rPr lang="pl-PL" dirty="0" smtClean="0"/>
-              <a:t>Testy jednostkowe</a:t>
-            </a:r>
-            <a:endParaRPr lang="pl-PL" dirty="0"/>
-          </a:p>
-        </p:txBody>
-      </p:sp>
-      <p:sp>
-        <p:nvSpPr>
-          <p:cNvPr id="3" name="Symbol zastępczy zawartości 2"/>
-          <p:cNvSpPr>
-            <a:spLocks noGrp="1"/>
-          </p:cNvSpPr>
-          <p:nvPr>
-            <p:ph idx="1"/>
-          </p:nvPr>
-        </p:nvSpPr>
-        <p:spPr>
-          <a:xfrm>
-            <a:off x="457200" y="1600201"/>
-            <a:ext cx="8147248" cy="4421088"/>
-          </a:xfrm>
-        </p:spPr>
-        <p:txBody>
-          <a:bodyPr>
-            <a:normAutofit fontScale="85000" lnSpcReduction="10000"/>
-          </a:bodyPr>
-          <a:lstStyle/>
-          <a:p>
-            <a:r>
-              <a:rPr lang="pl-PL" dirty="0" smtClean="0"/>
-              <a:t>Unifikacja wielomianu w postaci strumienia wejściowego</a:t>
-            </a:r>
-          </a:p>
-          <a:p>
-            <a:r>
-              <a:rPr lang="pl-PL" dirty="0" smtClean="0"/>
-              <a:t>Konwersja strumienia wejściowego na wielomian</a:t>
-            </a:r>
-          </a:p>
-          <a:p>
-            <a:r>
-              <a:rPr lang="pl-PL" dirty="0" smtClean="0"/>
-              <a:t>Podstawowe operacje na wielomianach: dodawanie, odejmowanie, mnożenie, dzielenie, modulo</a:t>
-            </a:r>
-          </a:p>
-          <a:p>
-            <a:r>
-              <a:rPr lang="pl-PL" dirty="0" smtClean="0"/>
-              <a:t>Obliczanie wartości wielomianu</a:t>
-            </a:r>
-          </a:p>
-          <a:p>
-            <a:r>
-              <a:rPr lang="pl-PL" dirty="0" smtClean="0"/>
-              <a:t>Obliczanie pochodnej wielomianu</a:t>
-            </a:r>
-          </a:p>
-          <a:p>
-            <a:r>
-              <a:rPr lang="pl-PL" dirty="0" smtClean="0"/>
-              <a:t>Obliczanie liczby pierwiastków w zadanym przedziale</a:t>
-            </a:r>
-          </a:p>
-          <a:p>
-            <a:r>
-              <a:rPr lang="pl-PL" dirty="0" smtClean="0"/>
-              <a:t>Eliminacja pierwiastków wielokrotnych</a:t>
-            </a:r>
-          </a:p>
-          <a:p>
-            <a:r>
-              <a:rPr lang="pl-PL" dirty="0" smtClean="0"/>
-              <a:t>Obliczanie pierwiastków w zadanym przedziale</a:t>
-            </a:r>
-          </a:p>
-          <a:p>
-            <a:endParaRPr lang="pl-PL" dirty="0" smtClean="0"/>
-          </a:p>
-        </p:txBody>
-      </p:sp>
-    </p:spTree>
-    <p:extLst>
-      <p:ext uri="{BB962C8B-B14F-4D97-AF65-F5344CB8AC3E}">
-        <p14:creationId xmlns:p14="http://schemas.microsoft.com/office/powerpoint/2010/main" val="2872807545"/>
-      </p:ext>
-    </p:extLst>
-  </p:cSld>
-  <p:clrMapOvr>
-    <a:masterClrMapping/>
-  </p:clrMapOvr>
-</p:sld>
-</file>
-
-<file path=ppt/slides/slide15.xml><?xml version="1.0" encoding="utf-8"?>
-<p:sld xmlns:a="http://schemas.openxmlformats.org/drawingml/2006/main" xmlns:r="http://schemas.openxmlformats.org/officeDocument/2006/relationships" xmlns:p="http://schemas.openxmlformats.org/presentationml/2006/main">
-  <p:cSld>
-    <p:spTree>
-      <p:nvGrpSpPr>
-        <p:cNvPr id="1" name=""/>
-        <p:cNvGrpSpPr/>
-        <p:nvPr/>
-      </p:nvGrpSpPr>
-      <p:grpSpPr>
-        <a:xfrm>
-          <a:off x="0" y="0"/>
-          <a:ext cx="0" cy="0"/>
-          <a:chOff x="0" y="0"/>
-          <a:chExt cx="0" cy="0"/>
-        </a:xfrm>
-      </p:grpSpPr>
-      <p:sp>
-        <p:nvSpPr>
-          <p:cNvPr id="2" name="Tytuł 1"/>
-          <p:cNvSpPr>
-            <a:spLocks noGrp="1"/>
-          </p:cNvSpPr>
-          <p:nvPr>
-            <p:ph type="title"/>
-          </p:nvPr>
-        </p:nvSpPr>
-        <p:spPr/>
-        <p:txBody>
-          <a:bodyPr>
-            <a:normAutofit/>
-          </a:bodyPr>
-          <a:lstStyle/>
-          <a:p>
-            <a:r>
-              <a:rPr lang="pl-PL" dirty="0" smtClean="0"/>
-              <a:t>Demo</a:t>
-            </a:r>
-            <a:endParaRPr lang="pl-PL" dirty="0"/>
-          </a:p>
-        </p:txBody>
-      </p:sp>
-      <p:sp>
-        <p:nvSpPr>
-          <p:cNvPr id="3" name="Symbol zastępczy zawartości 2"/>
-          <p:cNvSpPr>
-            <a:spLocks noGrp="1"/>
-          </p:cNvSpPr>
-          <p:nvPr>
-            <p:ph idx="1"/>
-          </p:nvPr>
-        </p:nvSpPr>
-        <p:spPr/>
-        <p:txBody>
-          <a:bodyPr>
-            <a:normAutofit/>
-          </a:bodyPr>
-          <a:lstStyle/>
-          <a:p>
-            <a:pPr marL="0" indent="0">
-              <a:buNone/>
-            </a:pPr>
-            <a:r>
-              <a:rPr lang="pl-PL" sz="2800" dirty="0" smtClean="0"/>
-              <a:t>Prezentacja aktualnego interfejsu i działania programu</a:t>
-            </a:r>
-            <a:endParaRPr lang="pl-PL" sz="2800" dirty="0"/>
-          </a:p>
-        </p:txBody>
-      </p:sp>
-    </p:spTree>
-    <p:extLst>
-      <p:ext uri="{BB962C8B-B14F-4D97-AF65-F5344CB8AC3E}">
-        <p14:creationId xmlns:p14="http://schemas.microsoft.com/office/powerpoint/2010/main" val="3493078588"/>
-      </p:ext>
-    </p:extLst>
-  </p:cSld>
-  <p:clrMapOvr>
-    <a:masterClrMapping/>
-  </p:clrMapOvr>
-</p:sld>
-</file>
-
-<file path=ppt/slides/slide16.xml><?xml version="1.0" encoding="utf-8"?>
-<p:sld xmlns:a="http://schemas.openxmlformats.org/drawingml/2006/main" xmlns:r="http://schemas.openxmlformats.org/officeDocument/2006/relationships" xmlns:p="http://schemas.openxmlformats.org/presentationml/2006/main">
-  <p:cSld>
-    <p:spTree>
-      <p:nvGrpSpPr>
-        <p:cNvPr id="1" name=""/>
-        <p:cNvGrpSpPr/>
-        <p:nvPr/>
-      </p:nvGrpSpPr>
-      <p:grpSpPr>
-        <a:xfrm>
-          <a:off x="0" y="0"/>
-          <a:ext cx="0" cy="0"/>
-          <a:chOff x="0" y="0"/>
-          <a:chExt cx="0" cy="0"/>
-        </a:xfrm>
-      </p:grpSpPr>
-      <p:sp>
-        <p:nvSpPr>
-          <p:cNvPr id="2" name="Tytuł 1"/>
-          <p:cNvSpPr>
-            <a:spLocks noGrp="1"/>
-          </p:cNvSpPr>
-          <p:nvPr>
-            <p:ph type="title"/>
-          </p:nvPr>
-        </p:nvSpPr>
-        <p:spPr/>
-        <p:txBody>
-          <a:bodyPr>
-            <a:normAutofit fontScale="90000"/>
-          </a:bodyPr>
-          <a:lstStyle/>
-          <a:p>
-            <a:r>
-              <a:rPr lang="pl-PL" dirty="0" smtClean="0"/>
-              <a:t>Wykorzystane środowiska i technologie</a:t>
-            </a:r>
-            <a:endParaRPr lang="pl-PL" dirty="0"/>
-          </a:p>
-        </p:txBody>
-      </p:sp>
-      <p:sp>
-        <p:nvSpPr>
-          <p:cNvPr id="3" name="Symbol zastępczy zawartości 2"/>
-          <p:cNvSpPr>
-            <a:spLocks noGrp="1"/>
-          </p:cNvSpPr>
-          <p:nvPr>
-            <p:ph idx="1"/>
-          </p:nvPr>
-        </p:nvSpPr>
-        <p:spPr/>
-        <p:txBody>
-          <a:bodyPr>
-            <a:normAutofit/>
-          </a:bodyPr>
-          <a:lstStyle/>
-          <a:p>
-            <a:pPr>
-              <a:buFontTx/>
-              <a:buChar char="-"/>
-            </a:pPr>
-            <a:r>
-              <a:rPr lang="pl-PL" sz="2800" dirty="0" smtClean="0"/>
-              <a:t>Język programowania: C++</a:t>
-            </a:r>
-          </a:p>
-          <a:p>
-            <a:pPr>
-              <a:buFontTx/>
-              <a:buChar char="-"/>
-            </a:pPr>
-            <a:r>
-              <a:rPr lang="pl-PL" sz="2800" dirty="0" smtClean="0"/>
-              <a:t>Visual Studio 2015:</a:t>
-            </a:r>
-          </a:p>
-          <a:p>
-            <a:pPr>
-              <a:buFontTx/>
-              <a:buChar char="-"/>
-            </a:pPr>
-            <a:r>
-              <a:rPr lang="pl-PL" sz="2800" dirty="0" smtClean="0"/>
-              <a:t>Podział na trzy projekty (moduły) w ramach jednej solucji (biblioteka + aplikacja + unit testy) </a:t>
-            </a:r>
-          </a:p>
-          <a:p>
-            <a:pPr>
-              <a:buFontTx/>
-              <a:buChar char="-"/>
-            </a:pPr>
-            <a:r>
-              <a:rPr lang="pl-PL" sz="2800" dirty="0" smtClean="0"/>
-              <a:t>Git (git extension)</a:t>
-            </a:r>
-          </a:p>
-          <a:p>
-            <a:pPr>
-              <a:buFontTx/>
-              <a:buChar char="-"/>
-            </a:pPr>
-            <a:r>
-              <a:rPr lang="pl-PL" sz="2800" dirty="0" smtClean="0"/>
-              <a:t>Kod na githubie</a:t>
-            </a:r>
-            <a:endParaRPr lang="pl-PL" sz="2800" dirty="0"/>
-          </a:p>
-        </p:txBody>
-      </p:sp>
-    </p:spTree>
-    <p:extLst>
-      <p:ext uri="{BB962C8B-B14F-4D97-AF65-F5344CB8AC3E}">
-        <p14:creationId xmlns:p14="http://schemas.microsoft.com/office/powerpoint/2010/main" val="1145578772"/>
-      </p:ext>
-    </p:extLst>
-  </p:cSld>
-  <p:clrMapOvr>
-    <a:masterClrMapping/>
-  </p:clrMapOvr>
-</p:sld>
-</file>
-
-<file path=ppt/slides/slide17.xml><?xml version="1.0" encoding="utf-8"?>
-<p:sld xmlns:a="http://schemas.openxmlformats.org/drawingml/2006/main" xmlns:r="http://schemas.openxmlformats.org/officeDocument/2006/relationships" xmlns:p="http://schemas.openxmlformats.org/presentationml/2006/main">
-  <p:cSld>
-    <p:spTree>
-      <p:nvGrpSpPr>
-        <p:cNvPr id="1" name=""/>
-        <p:cNvGrpSpPr/>
-        <p:nvPr/>
-      </p:nvGrpSpPr>
-      <p:grpSpPr>
-        <a:xfrm>
-          <a:off x="0" y="0"/>
-          <a:ext cx="0" cy="0"/>
-          <a:chOff x="0" y="0"/>
-          <a:chExt cx="0" cy="0"/>
-        </a:xfrm>
-      </p:grpSpPr>
-      <p:sp>
-        <p:nvSpPr>
-          <p:cNvPr id="2" name="Tytuł 1"/>
-          <p:cNvSpPr>
-            <a:spLocks noGrp="1"/>
-          </p:cNvSpPr>
-          <p:nvPr>
-            <p:ph type="title"/>
-          </p:nvPr>
-        </p:nvSpPr>
-        <p:spPr/>
-        <p:txBody>
-          <a:bodyPr>
-            <a:normAutofit/>
-          </a:bodyPr>
-          <a:lstStyle/>
-          <a:p>
-            <a:r>
-              <a:rPr lang="pl-PL" dirty="0" smtClean="0"/>
-              <a:t>Kryterium oceny problemu</a:t>
-            </a:r>
-            <a:endParaRPr lang="pl-PL" dirty="0"/>
-          </a:p>
-        </p:txBody>
-      </p:sp>
-      <p:sp>
-        <p:nvSpPr>
-          <p:cNvPr id="3" name="Symbol zastępczy zawartości 2"/>
-          <p:cNvSpPr>
-            <a:spLocks noGrp="1"/>
-          </p:cNvSpPr>
-          <p:nvPr>
-            <p:ph idx="1"/>
-          </p:nvPr>
-        </p:nvSpPr>
-        <p:spPr/>
-        <p:txBody>
-          <a:bodyPr>
-            <a:normAutofit fontScale="85000" lnSpcReduction="10000"/>
-          </a:bodyPr>
-          <a:lstStyle/>
-          <a:p>
-            <a:pPr>
-              <a:buFontTx/>
-              <a:buChar char="-"/>
-            </a:pPr>
-            <a:r>
-              <a:rPr lang="pl-PL" sz="2800" dirty="0" smtClean="0"/>
-              <a:t>Poprawne parsowanie</a:t>
-            </a:r>
-            <a:r>
-              <a:rPr lang="pl-PL" sz="2800" dirty="0" smtClean="0"/>
-              <a:t> wielomianu w oparciu o strumień wejściowy podawany na kilka sposobów</a:t>
-            </a:r>
-          </a:p>
-          <a:p>
-            <a:pPr>
-              <a:buFontTx/>
-              <a:buChar char="-"/>
-            </a:pPr>
-            <a:r>
-              <a:rPr lang="pl-PL" sz="2800" dirty="0"/>
-              <a:t>Porównanie struktur reprezentujących </a:t>
-            </a:r>
-            <a:r>
-              <a:rPr lang="pl-PL" sz="2800" dirty="0" smtClean="0"/>
-              <a:t>wielomiany</a:t>
-            </a:r>
-            <a:endParaRPr lang="pl-PL" sz="2800" dirty="0" smtClean="0"/>
-          </a:p>
-          <a:p>
-            <a:pPr>
-              <a:buFontTx/>
-              <a:buChar char="-"/>
-            </a:pPr>
-            <a:r>
-              <a:rPr lang="pl-PL" sz="2800" dirty="0" smtClean="0"/>
-              <a:t>Wszystkie testy jednostkowe zakończone powodzeniem</a:t>
-            </a:r>
-            <a:r>
-              <a:rPr lang="pl-PL" sz="2800" dirty="0"/>
-              <a:t> </a:t>
-            </a:r>
-            <a:r>
-              <a:rPr lang="pl-PL" sz="2800" dirty="0" smtClean="0"/>
-              <a:t>dla obu struktur</a:t>
-            </a:r>
-          </a:p>
-          <a:p>
-            <a:pPr>
-              <a:buFontTx/>
-              <a:buChar char="-"/>
-            </a:pPr>
-            <a:r>
-              <a:rPr lang="pl-PL" sz="2800" dirty="0" smtClean="0"/>
-              <a:t>Porównanie wydajności obu struktur pod względem czasowym</a:t>
-            </a:r>
-            <a:r>
-              <a:rPr lang="pl-PL" sz="2800" dirty="0"/>
-              <a:t> </a:t>
-            </a:r>
-            <a:r>
-              <a:rPr lang="pl-PL" sz="2800" dirty="0" smtClean="0"/>
-              <a:t>dla różnych przypadków wielomianu wejściowego:</a:t>
-            </a:r>
-          </a:p>
-          <a:p>
-            <a:pPr lvl="1">
-              <a:buFont typeface="Wingdings" panose="05000000000000000000" pitchFamily="2" charset="2"/>
-              <a:buChar char="§"/>
-            </a:pPr>
-            <a:r>
-              <a:rPr lang="pl-PL" sz="2400" dirty="0" smtClean="0"/>
-              <a:t>Wysoki stopień wielomianu</a:t>
-            </a:r>
-          </a:p>
-          <a:p>
-            <a:pPr lvl="1">
-              <a:buFont typeface="Wingdings" panose="05000000000000000000" pitchFamily="2" charset="2"/>
-              <a:buChar char="§"/>
-            </a:pPr>
-            <a:r>
-              <a:rPr lang="pl-PL" sz="2400" dirty="0" smtClean="0"/>
-              <a:t>Wielomian gęsty</a:t>
-            </a:r>
-          </a:p>
-          <a:p>
-            <a:pPr lvl="1">
-              <a:buFont typeface="Wingdings" panose="05000000000000000000" pitchFamily="2" charset="2"/>
-              <a:buChar char="§"/>
-            </a:pPr>
-            <a:r>
-              <a:rPr lang="pl-PL" sz="2400" dirty="0" smtClean="0"/>
-              <a:t>Wielomian rzadki</a:t>
-            </a:r>
-          </a:p>
-          <a:p>
-            <a:pPr lvl="1">
-              <a:buFont typeface="Wingdings" panose="05000000000000000000" pitchFamily="2" charset="2"/>
-              <a:buChar char="§"/>
-            </a:pPr>
-            <a:r>
-              <a:rPr lang="pl-PL" sz="2400" dirty="0" smtClean="0"/>
-              <a:t>Wielomian nie posiadający pierwiastków</a:t>
-            </a:r>
-          </a:p>
-          <a:p>
-            <a:pPr lvl="1">
-              <a:buFont typeface="Wingdings" panose="05000000000000000000" pitchFamily="2" charset="2"/>
-              <a:buChar char="§"/>
-            </a:pPr>
-            <a:r>
-              <a:rPr lang="pl-PL" sz="2400" dirty="0" smtClean="0"/>
-              <a:t>Wielomian posiadający pierwiastki wielokrotne</a:t>
-            </a:r>
-          </a:p>
-        </p:txBody>
-      </p:sp>
-    </p:spTree>
-    <p:extLst>
-      <p:ext uri="{BB962C8B-B14F-4D97-AF65-F5344CB8AC3E}">
-        <p14:creationId xmlns:p14="http://schemas.microsoft.com/office/powerpoint/2010/main" val="3322992260"/>
-      </p:ext>
-    </p:extLst>
-  </p:cSld>
-  <p:clrMapOvr>
-    <a:masterClrMapping/>
-  </p:clrMapOvr>
-</p:sld>
-</file>
-
-<file path=ppt/slides/slide18.xml><?xml version="1.0" encoding="utf-8"?>
-<p:sld xmlns:a="http://schemas.openxmlformats.org/drawingml/2006/main" xmlns:r="http://schemas.openxmlformats.org/officeDocument/2006/relationships" xmlns:p="http://schemas.openxmlformats.org/presentationml/2006/main">
-  <p:cSld>
-    <p:spTree>
-      <p:nvGrpSpPr>
-        <p:cNvPr id="1" name=""/>
-        <p:cNvGrpSpPr/>
-        <p:nvPr/>
-      </p:nvGrpSpPr>
-      <p:grpSpPr>
-        <a:xfrm>
-          <a:off x="0" y="0"/>
-          <a:ext cx="0" cy="0"/>
-          <a:chOff x="0" y="0"/>
-          <a:chExt cx="0" cy="0"/>
-        </a:xfrm>
-      </p:grpSpPr>
-      <p:sp>
-        <p:nvSpPr>
-          <p:cNvPr id="2" name="Tytuł 1"/>
-          <p:cNvSpPr>
-            <a:spLocks noGrp="1"/>
-          </p:cNvSpPr>
-          <p:nvPr>
-            <p:ph type="title"/>
-          </p:nvPr>
-        </p:nvSpPr>
-        <p:spPr/>
-        <p:txBody>
-          <a:bodyPr>
-            <a:normAutofit/>
-          </a:bodyPr>
-          <a:lstStyle/>
-          <a:p>
-            <a:r>
-              <a:rPr lang="pl-PL" dirty="0" smtClean="0"/>
               <a:t>Podsumowanie</a:t>
             </a:r>
             <a:endParaRPr lang="pl-PL" dirty="0"/>
@@ -4260,7 +3406,6 @@
               <a:rPr lang="pl-PL" dirty="0" smtClean="0"/>
               <a:t>Tworzenie wielomianu na podstawie standardowego wejścia</a:t>
             </a:r>
-            <a:endParaRPr lang="pl-PL" dirty="0" smtClean="0"/>
           </a:p>
           <a:p>
             <a:pPr>
@@ -4281,7 +3426,6 @@
               <a:rPr lang="pl-PL" dirty="0" smtClean="0"/>
               <a:t>Porównanie struktur wielomianu pod względem czasowym zarówno dla standardowych wielomianów, jak i dla specyficznych przypadków</a:t>
             </a:r>
-            <a:endParaRPr lang="pl-PL" dirty="0" smtClean="0"/>
           </a:p>
         </p:txBody>
       </p:sp>
@@ -4449,12 +3593,14 @@
         </p:nvSpPr>
         <p:spPr/>
         <p:txBody>
-          <a:bodyPr/>
-          <a:lstStyle/>
-          <a:p>
-            <a:r>
-              <a:rPr lang="pl-PL" dirty="0" smtClean="0"/>
-              <a:t>Główne problemy do rozwiązania</a:t>
+          <a:bodyPr>
+            <a:normAutofit/>
+          </a:bodyPr>
+          <a:lstStyle/>
+          <a:p>
+            <a:r>
+              <a:rPr lang="pl-PL" dirty="0" smtClean="0"/>
+              <a:t>Przyjęte rozwiązanie</a:t>
             </a:r>
             <a:endParaRPr lang="pl-PL" dirty="0"/>
           </a:p>
@@ -4473,46 +3619,49 @@
         <p:spPr/>
         <p:txBody>
           <a:bodyPr>
-            <a:normAutofit fontScale="92500" lnSpcReduction="20000"/>
+            <a:normAutofit fontScale="92500"/>
           </a:bodyPr>
           <a:lstStyle/>
           <a:p>
             <a:r>
               <a:rPr lang="pl-PL" dirty="0" smtClean="0"/>
-              <a:t>Znalezienie metody, odnajdującej wszystkie rzeczywiste pierwiastki wielomianów</a:t>
-            </a:r>
-          </a:p>
-          <a:p>
-            <a:r>
-              <a:rPr lang="pl-PL" dirty="0" smtClean="0"/>
-              <a:t>Konstrukcja intuicyjnego interfejsu, pozwalającego na łatwe wprowadzanie danych wejściowych</a:t>
-            </a:r>
-          </a:p>
-          <a:p>
-            <a:r>
-              <a:rPr lang="pl-PL" dirty="0" smtClean="0"/>
-              <a:t>Wysoka precyzja obliczeń – eliminacja błędów zaokrągleń</a:t>
-            </a:r>
-          </a:p>
-          <a:p>
-            <a:r>
-              <a:rPr lang="pl-PL" dirty="0" smtClean="0"/>
-              <a:t>Wybór struktury do reprezentacji wielomianu</a:t>
-            </a:r>
-          </a:p>
-          <a:p>
-            <a:r>
-              <a:rPr lang="pl-PL" dirty="0" smtClean="0"/>
-              <a:t>Optymalizacja podstawowych działań na wielomianach</a:t>
+              <a:t>Implemetancja w C++</a:t>
+            </a:r>
+          </a:p>
+          <a:p>
+            <a:r>
+              <a:rPr lang="pl-PL" dirty="0" smtClean="0"/>
+              <a:t>Konsola jako interfejs aplikacji, umożliwiający wprowadzania danych wejściowych</a:t>
             </a:r>
             <a:endParaRPr lang="pl-PL" dirty="0"/>
+          </a:p>
+          <a:p>
+            <a:r>
+              <a:rPr lang="pl-PL" dirty="0" smtClean="0"/>
+              <a:t>Testy jednostkowe, napisane z użyciem frameworka wbudowanego w Visual Studio 2015</a:t>
+            </a:r>
+          </a:p>
+          <a:p>
+            <a:r>
+              <a:rPr lang="pl-PL" dirty="0" smtClean="0"/>
+              <a:t>Podział funkcjonalności na klasy</a:t>
+            </a:r>
+          </a:p>
+          <a:p>
+            <a:r>
+              <a:rPr lang="pl-PL" dirty="0" smtClean="0"/>
+              <a:t>Struktury wielomianu posiadający wspólną klasę bazową i implementujące jej metody abstrakcyjne</a:t>
+            </a:r>
+          </a:p>
+          <a:p>
+            <a:endParaRPr lang="pl-PL" dirty="0" smtClean="0"/>
           </a:p>
         </p:txBody>
       </p:sp>
     </p:spTree>
     <p:extLst>
       <p:ext uri="{BB962C8B-B14F-4D97-AF65-F5344CB8AC3E}">
-        <p14:creationId xmlns:p14="http://schemas.microsoft.com/office/powerpoint/2010/main" val="3175249755"/>
+        <p14:creationId xmlns:p14="http://schemas.microsoft.com/office/powerpoint/2010/main" val="3586097633"/>
       </p:ext>
     </p:extLst>
   </p:cSld>
@@ -4552,67 +3701,118 @@
         <p:spPr/>
         <p:txBody>
           <a:bodyPr>
-            <a:normAutofit fontScale="90000"/>
+            <a:normAutofit/>
           </a:bodyPr>
           <a:lstStyle/>
           <a:p>
             <a:r>
+              <a:rPr lang="pl-PL" dirty="0" smtClean="0"/>
+              <a:t>Podział na klasy</a:t>
+            </a:r>
+            <a:endParaRPr lang="pl-PL" dirty="0"/>
+          </a:p>
+        </p:txBody>
+      </p:sp>
+      <p:sp>
+        <p:nvSpPr>
+          <p:cNvPr id="3" name="Symbol zastępczy zawartości 2"/>
+          <p:cNvSpPr>
+            <a:spLocks noGrp="1"/>
+          </p:cNvSpPr>
+          <p:nvPr>
+            <p:ph idx="1"/>
+          </p:nvPr>
+        </p:nvSpPr>
+        <p:spPr>
+          <a:xfrm>
+            <a:off x="457200" y="1600201"/>
+            <a:ext cx="7715200" cy="4421088"/>
+          </a:xfrm>
+        </p:spPr>
+        <p:txBody>
+          <a:bodyPr>
+            <a:normAutofit fontScale="77500" lnSpcReduction="20000"/>
+          </a:bodyPr>
+          <a:lstStyle/>
+          <a:p>
+            <a:r>
+              <a:rPr lang="pl-PL" dirty="0" smtClean="0"/>
+              <a:t>CharsConstant i StringManager - klasy zarządzające znakami i łańcuchami znaków</a:t>
+            </a:r>
+          </a:p>
+          <a:p>
+            <a:r>
+              <a:rPr lang="pl-PL" dirty="0" smtClean="0"/>
+              <a:t>Number – klasa zarządzająca długimi liczbami</a:t>
+            </a:r>
+          </a:p>
+          <a:p>
+            <a:r>
+              <a:rPr lang="pl-PL" dirty="0" smtClean="0"/>
+              <a:t>Parser – klasa tworząca strukturę wielomianu ze strumienia wejściowego</a:t>
+            </a:r>
+          </a:p>
+          <a:p>
+            <a:r>
+              <a:rPr lang="pl-PL" dirty="0" smtClean="0"/>
+              <a:t>Polynomial – klasa abstrakcyjna reprezentująca wielomian</a:t>
+            </a:r>
+          </a:p>
+          <a:p>
+            <a:r>
+              <a:rPr lang="pl-PL" dirty="0" smtClean="0"/>
+              <a:t>PolynomialMap – klasa reprezentująca wielomian w postaci </a:t>
+            </a:r>
+            <a:r>
               <a:rPr lang="pl-PL" dirty="0"/>
-              <a:t>Wybór struktury do reprezentacja wielomianu</a:t>
-            </a:r>
-          </a:p>
-        </p:txBody>
-      </p:sp>
-      <p:sp>
-        <p:nvSpPr>
-          <p:cNvPr id="3" name="Symbol zastępczy zawartości 2"/>
-          <p:cNvSpPr>
-            <a:spLocks noGrp="1"/>
-          </p:cNvSpPr>
-          <p:nvPr>
-            <p:ph idx="1"/>
-          </p:nvPr>
-        </p:nvSpPr>
-        <p:spPr/>
-        <p:txBody>
-          <a:bodyPr>
-            <a:normAutofit fontScale="92500" lnSpcReduction="10000"/>
-          </a:bodyPr>
-          <a:lstStyle/>
-          <a:p>
-            <a:r>
-              <a:rPr lang="pl-PL" dirty="0" smtClean="0"/>
-              <a:t>Reprezentacja wielomianu w pamięci na dwa sposoby:</a:t>
-            </a:r>
-          </a:p>
-          <a:p>
-            <a:pPr lvl="1"/>
-            <a:r>
-              <a:rPr lang="pl-PL" dirty="0" smtClean="0"/>
-              <a:t>Trzymanie tylko niezerowych współczynników wielomianu (mapa)</a:t>
-            </a:r>
-          </a:p>
-          <a:p>
-            <a:pPr lvl="1"/>
-            <a:r>
-              <a:rPr lang="pl-PL" dirty="0" smtClean="0"/>
-              <a:t>Trzymanie wszystkich współczynników wielomianu (tablica)</a:t>
-            </a:r>
-            <a:endParaRPr lang="pl-PL" dirty="0"/>
-          </a:p>
-          <a:p>
-            <a:r>
-              <a:rPr lang="pl-PL" dirty="0" smtClean="0"/>
-              <a:t>Przeprowadzenie testów i porównanie wydajności obu struktur pod względem czasowym (być może także pod względem pamięciowym)</a:t>
-            </a:r>
-            <a:endParaRPr lang="pl-PL" dirty="0"/>
+              <a:t>mapy - </a:t>
+            </a:r>
+            <a:r>
+              <a:rPr lang="pl-PL" dirty="0" smtClean="0"/>
+              <a:t>trzymanie </a:t>
+            </a:r>
+            <a:r>
+              <a:rPr lang="pl-PL" dirty="0"/>
+              <a:t>tylko niezerowych </a:t>
+            </a:r>
+            <a:r>
+              <a:rPr lang="pl-PL" dirty="0" smtClean="0"/>
+              <a:t>współczynników</a:t>
+            </a:r>
+          </a:p>
+          <a:p>
+            <a:r>
+              <a:rPr lang="pl-PL" dirty="0" smtClean="0"/>
+              <a:t>PolynomialVector </a:t>
+            </a:r>
+            <a:r>
+              <a:rPr lang="pl-PL" dirty="0" smtClean="0"/>
+              <a:t>– klasa reprezentująca wielomian w postaci </a:t>
+            </a:r>
+            <a:r>
+              <a:rPr lang="pl-PL" dirty="0"/>
+              <a:t>tablicy - </a:t>
+            </a:r>
+            <a:r>
+              <a:rPr lang="pl-PL" dirty="0" smtClean="0"/>
+              <a:t>trzymanie </a:t>
+            </a:r>
+            <a:r>
+              <a:rPr lang="pl-PL" dirty="0"/>
+              <a:t>wszystkich </a:t>
+            </a:r>
+            <a:r>
+              <a:rPr lang="pl-PL" dirty="0" smtClean="0"/>
+              <a:t>współczynników</a:t>
+            </a:r>
+            <a:endParaRPr lang="pl-PL" dirty="0" smtClean="0"/>
           </a:p>
         </p:txBody>
       </p:sp>
     </p:spTree>
     <p:extLst>
       <p:ext uri="{BB962C8B-B14F-4D97-AF65-F5344CB8AC3E}">
-        <p14:creationId xmlns:p14="http://schemas.microsoft.com/office/powerpoint/2010/main" val="1712972280"/>
+        <p14:creationId xmlns:p14="http://schemas.microsoft.com/office/powerpoint/2010/main" val="1962515182"/>
       </p:ext>
     </p:extLst>
   </p:cSld>
@@ -4652,22 +3852,15 @@
         <p:spPr/>
         <p:txBody>
           <a:bodyPr>
-            <a:normAutofit fontScale="90000"/>
+            <a:normAutofit/>
           </a:bodyPr>
           <a:lstStyle/>
           <a:p>
             <a:r>
-              <a:rPr lang="pl-PL" dirty="0"/>
-              <a:t>Precyzja </a:t>
-            </a:r>
-            <a:r>
-              <a:rPr lang="pl-PL" dirty="0" smtClean="0"/>
-              <a:t>obliczeń i błędy </a:t>
-            </a:r>
-            <a:r>
-              <a:rPr lang="pl-PL" dirty="0"/>
-              <a:t>zaokrągleń</a:t>
-            </a:r>
+              <a:rPr lang="pl-PL" dirty="0" smtClean="0"/>
+              <a:t>Główne funkcje</a:t>
+            </a:r>
+            <a:endParaRPr lang="pl-PL" dirty="0"/>
           </a:p>
         </p:txBody>
       </p:sp>
@@ -4681,62 +3874,80 @@
             <p:ph idx="1"/>
           </p:nvPr>
         </p:nvSpPr>
-        <p:spPr/>
+        <p:spPr>
+          <a:xfrm>
+            <a:off x="251520" y="1600201"/>
+            <a:ext cx="8784976" cy="4421088"/>
+          </a:xfrm>
+        </p:spPr>
         <p:txBody>
           <a:bodyPr>
-            <a:normAutofit fontScale="70000" lnSpcReduction="20000"/>
+            <a:normAutofit fontScale="85000" lnSpcReduction="20000"/>
           </a:bodyPr>
           <a:lstStyle/>
           <a:p>
             <a:r>
               <a:rPr lang="pl-PL" dirty="0" smtClean="0"/>
-              <a:t>Brak stabilności - obliczenia na wielomianach, zwłaszcza wysokich stopni, wymagają dużej precyzji obliczeń – drobna zmiana może zupełnie zmienić wartość wielomianu i jego pierwiastki</a:t>
-            </a:r>
-          </a:p>
-          <a:p>
-            <a:r>
-              <a:rPr lang="pl-PL" dirty="0" smtClean="0"/>
-              <a:t>Żaden z podstawowych typów w C++ nie rozwiązuje problemu długich liczb</a:t>
-            </a:r>
-          </a:p>
-          <a:p>
-            <a:r>
-              <a:rPr lang="pl-PL" dirty="0" smtClean="0"/>
-              <a:t>Konieczność użycia dodatkowej biblioteki </a:t>
-            </a:r>
-            <a:r>
-              <a:rPr lang="pl-PL" dirty="0"/>
-              <a:t>długich liczb </a:t>
-            </a:r>
-            <a:r>
-              <a:rPr lang="pl-PL" dirty="0" smtClean="0"/>
-              <a:t>(np. GNU MP library) albo własnej implementacji</a:t>
-            </a:r>
-          </a:p>
-          <a:p>
-            <a:r>
-              <a:rPr lang="pl-PL" dirty="0" smtClean="0"/>
-              <a:t>Współczynniki wielomianu są liczbami wymiernymi – można je reprezentować w postaci ilorazu dwóch liczb: licznika i mianownika</a:t>
-            </a:r>
-          </a:p>
-          <a:p>
-            <a:r>
-              <a:rPr lang="pl-PL" dirty="0" smtClean="0"/>
-              <a:t>Każdą z liczb (licznik i mianownik) można reprezentować jako długą liczbę całkowitą lub cały ułamek jako liczbę wymierną</a:t>
+              <a:t>Podstawowe operacje na wielomianach: dodawanie, odejmowanie, mnożenie, dzielenie, modulo, potęgowanie</a:t>
+            </a:r>
+          </a:p>
+          <a:p>
+            <a:r>
+              <a:rPr lang="pl-PL" dirty="0" smtClean="0"/>
+              <a:t>Porównywanie wielomianu</a:t>
+            </a:r>
+          </a:p>
+          <a:p>
+            <a:r>
+              <a:rPr lang="pl-PL" dirty="0" smtClean="0"/>
+              <a:t>Obliczanie wartości wielomianu</a:t>
+            </a:r>
+          </a:p>
+          <a:p>
+            <a:r>
+              <a:rPr lang="pl-PL" dirty="0" smtClean="0"/>
+              <a:t>Obliczanie pochodnej wielomianu</a:t>
+            </a:r>
+          </a:p>
+          <a:p>
+            <a:r>
+              <a:rPr lang="pl-PL" dirty="0" smtClean="0"/>
+              <a:t>Oliczanie NWD wielomianów</a:t>
+            </a:r>
+          </a:p>
+          <a:p>
+            <a:r>
+              <a:rPr lang="pl-PL" dirty="0" smtClean="0"/>
+              <a:t>Obliczanie liczby pierwiastków w zadanym przedziale</a:t>
+            </a:r>
+          </a:p>
+          <a:p>
+            <a:r>
+              <a:rPr lang="pl-PL" dirty="0" smtClean="0"/>
+              <a:t>Eliminacja pierwiastków wielokrotnych</a:t>
+            </a:r>
+          </a:p>
+          <a:p>
+            <a:r>
+              <a:rPr lang="pl-PL" dirty="0" smtClean="0"/>
+              <a:t>Obliczanie wyrazów ciągu Sturma</a:t>
+            </a:r>
+          </a:p>
+          <a:p>
+            <a:r>
+              <a:rPr lang="pl-PL" dirty="0" smtClean="0"/>
+              <a:t>Obliczanie pierwiastków w zadanym przedziale</a:t>
             </a:r>
           </a:p>
           <a:p>
             <a:endParaRPr lang="pl-PL" dirty="0" smtClean="0"/>
-          </a:p>
-          <a:p>
-            <a:endParaRPr lang="pl-PL" dirty="0"/>
           </a:p>
         </p:txBody>
       </p:sp>
     </p:spTree>
     <p:extLst>
       <p:ext uri="{BB962C8B-B14F-4D97-AF65-F5344CB8AC3E}">
-        <p14:creationId xmlns:p14="http://schemas.microsoft.com/office/powerpoint/2010/main" val="1600164141"/>
+        <p14:creationId xmlns:p14="http://schemas.microsoft.com/office/powerpoint/2010/main" val="4095873739"/>
       </p:ext>
     </p:extLst>
   </p:cSld>
@@ -4782,7 +3993,7 @@
           <a:p>
             <a:r>
               <a:rPr lang="pl-PL" dirty="0" smtClean="0"/>
-              <a:t>GNU MP library</a:t>
+              <a:t>Problemy implementacyjne</a:t>
             </a:r>
             <a:endParaRPr lang="pl-PL" dirty="0"/>
           </a:p>
@@ -4801,58 +4012,70 @@
         <p:spPr/>
         <p:txBody>
           <a:bodyPr>
-            <a:normAutofit fontScale="85000" lnSpcReduction="10000"/>
+            <a:normAutofit fontScale="92500"/>
           </a:bodyPr>
           <a:lstStyle/>
           <a:p>
             <a:r>
-              <a:rPr lang="pl-PL" dirty="0" smtClean="0"/>
-              <a:t>Biblioteka programistyczna dla języków m.in. C, C++</a:t>
-            </a:r>
-          </a:p>
-          <a:p>
-            <a:r>
-              <a:rPr lang="pl-PL" dirty="0" smtClean="0"/>
-              <a:t>Udostępnia liczby całkowite oraz wymierne</a:t>
-            </a:r>
-          </a:p>
-          <a:p>
-            <a:r>
-              <a:rPr lang="pl-PL" dirty="0" smtClean="0"/>
-              <a:t>Jedynym ograniczeniem precyzji jest dostępna pamięć</a:t>
-            </a:r>
-          </a:p>
-          <a:p>
-            <a:r>
-              <a:rPr lang="pl-PL" dirty="0" smtClean="0"/>
-              <a:t>Jest to zoptymalizowany kod asemblerowy</a:t>
-            </a:r>
-          </a:p>
-          <a:p>
-            <a:r>
-              <a:rPr lang="pl-PL" dirty="0" smtClean="0"/>
-              <a:t>Używane różne algorytmy dla odpowiednich operandów, optymalizujące działania dla małych            i dużych liczb</a:t>
-            </a:r>
-          </a:p>
-          <a:p>
-            <a:r>
-              <a:rPr lang="pl-PL" dirty="0" smtClean="0"/>
-              <a:t>Instalacja pod Windowsem wymaga MinGW lub Cygwina</a:t>
-            </a:r>
-          </a:p>
-          <a:p>
-            <a:r>
-              <a:rPr lang="pl-PL" dirty="0" smtClean="0"/>
-              <a:t>Licencja LGPL</a:t>
-            </a:r>
-            <a:endParaRPr lang="pl-PL" dirty="0"/>
+              <a:rPr lang="pl-PL" sz="2800" dirty="0" smtClean="0"/>
+              <a:t>Konstrukcja </a:t>
+            </a:r>
+            <a:r>
+              <a:rPr lang="pl-PL" sz="2800" dirty="0"/>
+              <a:t>intuicyjnego interfejsu, pozwalającego na łatwe wprowadzanie danych </a:t>
+            </a:r>
+            <a:r>
+              <a:rPr lang="pl-PL" sz="2800" dirty="0" smtClean="0"/>
+              <a:t>wejściowych</a:t>
+            </a:r>
+            <a:endParaRPr lang="pl-PL" sz="2800" dirty="0" smtClean="0"/>
+          </a:p>
+          <a:p>
+            <a:r>
+              <a:rPr lang="pl-PL" sz="2800" dirty="0"/>
+              <a:t>Brak stabilności - obliczenia na wielomianach, zwłaszcza wysokich stopni, wymagają dużej precyzji obliczeń – drobna zmiana może zupełnie zmienić wartość wielomianu i jego </a:t>
+            </a:r>
+            <a:r>
+              <a:rPr lang="pl-PL" sz="2800" dirty="0" smtClean="0"/>
+              <a:t>pierwiastki</a:t>
+            </a:r>
+          </a:p>
+          <a:p>
+            <a:r>
+              <a:rPr lang="pl-PL" sz="2800" dirty="0"/>
+              <a:t>Wysoka precyzja obliczeń – eliminacja błędów </a:t>
+            </a:r>
+            <a:r>
+              <a:rPr lang="pl-PL" sz="2800" dirty="0" smtClean="0"/>
+              <a:t>zaokrągleń</a:t>
+            </a:r>
+          </a:p>
+          <a:p>
+            <a:r>
+              <a:rPr lang="pl-PL" sz="2800" dirty="0" smtClean="0"/>
+              <a:t>Konieczność użycia biblioteki dla dużych liczb (GNU MP library)</a:t>
+            </a:r>
+            <a:endParaRPr lang="pl-PL" sz="2800" dirty="0"/>
+          </a:p>
+          <a:p>
+            <a:r>
+              <a:rPr lang="pl-PL" sz="2800" dirty="0" smtClean="0"/>
+              <a:t>Optymalizacja </a:t>
+            </a:r>
+            <a:r>
+              <a:rPr lang="pl-PL" sz="2800" dirty="0"/>
+              <a:t>podstawowych działań na wielomianach</a:t>
+            </a:r>
+          </a:p>
+          <a:p>
+            <a:endParaRPr lang="pl-PL" sz="2800" dirty="0"/>
           </a:p>
         </p:txBody>
       </p:sp>
     </p:spTree>
     <p:extLst>
       <p:ext uri="{BB962C8B-B14F-4D97-AF65-F5344CB8AC3E}">
-        <p14:creationId xmlns:p14="http://schemas.microsoft.com/office/powerpoint/2010/main" val="1159472883"/>
+        <p14:creationId xmlns:p14="http://schemas.microsoft.com/office/powerpoint/2010/main" val="3493078588"/>
       </p:ext>
     </p:extLst>
   </p:cSld>
@@ -4892,13 +4115,13 @@
         <p:spPr/>
         <p:txBody>
           <a:bodyPr>
-            <a:normAutofit fontScale="90000"/>
+            <a:normAutofit/>
           </a:bodyPr>
           <a:lstStyle/>
           <a:p>
             <a:r>
               <a:rPr lang="pl-PL" dirty="0" smtClean="0"/>
-              <a:t>Intuicyjny interfejs, pozwalający na łatwe wprowadzanie danych</a:t>
+              <a:t>Demo</a:t>
             </a:r>
             <a:endParaRPr lang="pl-PL" dirty="0"/>
           </a:p>
@@ -4917,83 +4140,25 @@
         <p:spPr/>
         <p:txBody>
           <a:bodyPr>
-            <a:normAutofit fontScale="77500" lnSpcReduction="20000"/>
+            <a:normAutofit/>
           </a:bodyPr>
           <a:lstStyle/>
           <a:p>
-            <a:r>
-              <a:rPr lang="pl-PL" dirty="0" smtClean="0"/>
-              <a:t>Wprowadzanie dowolnych (poprawnych składniowo) wyrażeń</a:t>
-            </a:r>
-          </a:p>
-          <a:p>
-            <a:r>
-              <a:rPr lang="pl-PL" dirty="0" smtClean="0"/>
-              <a:t>Wyrażenie zostaje parsowane i zapisane w strukturze, reprezentującej wielomian w pamięci</a:t>
-            </a:r>
-          </a:p>
-          <a:p>
-            <a:r>
-              <a:rPr lang="pl-PL" dirty="0" smtClean="0"/>
-              <a:t>Walidacja wyrażenia pod względem poprawności składniowej</a:t>
-            </a:r>
-          </a:p>
-          <a:p>
-            <a:r>
-              <a:rPr lang="pl-PL" dirty="0" smtClean="0"/>
-              <a:t>Brak potrzeby wpisywanie znaków * oraz ^ w oczywistych miejscach</a:t>
-            </a:r>
-          </a:p>
-          <a:p>
-            <a:r>
-              <a:rPr lang="pl-PL" dirty="0" smtClean="0"/>
-              <a:t>Dopuszczalne typy wyrażeń:</a:t>
-            </a:r>
-          </a:p>
-          <a:p>
             <a:pPr marL="0" indent="0">
               <a:buNone/>
             </a:pPr>
             <a:r>
-              <a:rPr lang="pl-PL" dirty="0" smtClean="0"/>
-              <a:t>	- 5x4 + x3 + x2 + 3</a:t>
-            </a:r>
-          </a:p>
-          <a:p>
-            <a:pPr marL="0" indent="0">
-              <a:buNone/>
-            </a:pPr>
-            <a:r>
-              <a:rPr lang="pl-PL" dirty="0"/>
-              <a:t>	</a:t>
-            </a:r>
-            <a:r>
-              <a:rPr lang="pl-PL" dirty="0" smtClean="0"/>
-              <a:t>- x3 + 2x3 + 4x + 8x + 3</a:t>
-            </a:r>
-          </a:p>
-          <a:p>
-            <a:pPr marL="0" indent="0">
-              <a:buNone/>
-            </a:pPr>
-            <a:r>
-              <a:rPr lang="pl-PL" dirty="0"/>
-              <a:t>	</a:t>
-            </a:r>
-            <a:r>
-              <a:rPr lang="pl-PL" dirty="0" smtClean="0"/>
-              <a:t>- (x+2)(2x2 + 3x + 4)^2</a:t>
-            </a:r>
-          </a:p>
-          <a:p>
-            <a:endParaRPr lang="pl-PL" dirty="0"/>
+              <a:rPr lang="pl-PL" sz="2800" dirty="0" smtClean="0"/>
+              <a:t>Prezentacja aktualnego interfejsu i działania programu</a:t>
+            </a:r>
+            <a:endParaRPr lang="pl-PL" sz="2800" dirty="0"/>
           </a:p>
         </p:txBody>
       </p:sp>
     </p:spTree>
     <p:extLst>
       <p:ext uri="{BB962C8B-B14F-4D97-AF65-F5344CB8AC3E}">
-        <p14:creationId xmlns:p14="http://schemas.microsoft.com/office/powerpoint/2010/main" val="1351904511"/>
+        <p14:creationId xmlns:p14="http://schemas.microsoft.com/office/powerpoint/2010/main" val="1747473448"/>
       </p:ext>
     </p:extLst>
   </p:cSld>
@@ -5033,13 +4198,13 @@
         <p:spPr/>
         <p:txBody>
           <a:bodyPr>
-            <a:normAutofit fontScale="90000"/>
+            <a:normAutofit/>
           </a:bodyPr>
           <a:lstStyle/>
           <a:p>
             <a:r>
               <a:rPr lang="pl-PL" dirty="0" smtClean="0"/>
-              <a:t>Znane sposoby rozwiązywania równań nieliniowych</a:t>
+              <a:t>Testy jednostkowe</a:t>
             </a:r>
             <a:endParaRPr lang="pl-PL" dirty="0"/>
           </a:p>
@@ -5057,82 +4222,72 @@
         </p:nvSpPr>
         <p:spPr>
           <a:xfrm>
-            <a:off x="457200" y="2564904"/>
-            <a:ext cx="8229600" cy="3561259"/>
+            <a:off x="457200" y="1600201"/>
+            <a:ext cx="8147248" cy="4421088"/>
           </a:xfrm>
         </p:spPr>
         <p:txBody>
-          <a:bodyPr/>
-          <a:lstStyle/>
-          <a:p>
-            <a:pPr>
-              <a:buFont typeface="Calibri" panose="020F0502020204030204" pitchFamily="34" charset="0"/>
-              <a:buChar char="‒"/>
-            </a:pPr>
-            <a:r>
-              <a:rPr lang="pl-PL" dirty="0" smtClean="0"/>
-              <a:t>Metoda bisekcji</a:t>
-            </a:r>
-          </a:p>
-          <a:p>
-            <a:pPr>
-              <a:buFont typeface="Calibri" panose="020F0502020204030204" pitchFamily="34" charset="0"/>
-              <a:buChar char="‒"/>
-            </a:pPr>
-            <a:r>
-              <a:rPr lang="pl-PL" dirty="0" smtClean="0"/>
-              <a:t>Metoda Newtona-</a:t>
-            </a:r>
-            <a:r>
-              <a:rPr lang="pl-PL" dirty="0" err="1" smtClean="0"/>
-              <a:t>Raphsona</a:t>
-            </a:r>
-            <a:r>
-              <a:rPr lang="pl-PL" dirty="0" smtClean="0"/>
-              <a:t> (metoda stycznych)</a:t>
-            </a:r>
-          </a:p>
-          <a:p>
-            <a:pPr>
-              <a:buFont typeface="Calibri" panose="020F0502020204030204" pitchFamily="34" charset="0"/>
-              <a:buChar char="‒"/>
-            </a:pPr>
-            <a:r>
-              <a:rPr lang="pl-PL" dirty="0" smtClean="0"/>
-              <a:t>Metoda Eulera (metoda siecznych)</a:t>
-            </a:r>
-          </a:p>
-          <a:p>
-            <a:pPr>
-              <a:buFont typeface="Calibri" panose="020F0502020204030204" pitchFamily="34" charset="0"/>
-              <a:buChar char="‒"/>
-            </a:pPr>
-            <a:r>
-              <a:rPr lang="pl-PL" dirty="0" smtClean="0"/>
-              <a:t>Reguła </a:t>
-            </a:r>
-            <a:r>
-              <a:rPr lang="pl-PL" dirty="0" err="1" smtClean="0"/>
-              <a:t>falsi</a:t>
-            </a:r>
+          <a:bodyPr>
+            <a:normAutofit fontScale="85000" lnSpcReduction="10000"/>
+          </a:bodyPr>
+          <a:lstStyle/>
+          <a:p>
+            <a:r>
+              <a:rPr lang="pl-PL" dirty="0" smtClean="0"/>
+              <a:t>Unifikacja wielomianu w postaci strumienia wejściowego</a:t>
+            </a:r>
+          </a:p>
+          <a:p>
+            <a:r>
+              <a:rPr lang="pl-PL" dirty="0" smtClean="0"/>
+              <a:t>Konwersja strumienia wejściowego na wielomian</a:t>
+            </a:r>
+          </a:p>
+          <a:p>
+            <a:r>
+              <a:rPr lang="pl-PL" dirty="0" smtClean="0"/>
+              <a:t>Podstawowe operacje na wielomianach: dodawanie, odejmowanie, mnożenie, dzielenie, modulo</a:t>
+            </a:r>
+          </a:p>
+          <a:p>
+            <a:r>
+              <a:rPr lang="pl-PL" dirty="0" smtClean="0"/>
+              <a:t>Obliczanie wartości wielomianu</a:t>
+            </a:r>
+          </a:p>
+          <a:p>
+            <a:r>
+              <a:rPr lang="pl-PL" dirty="0" smtClean="0"/>
+              <a:t>Obliczanie pochodnej wielomianu</a:t>
+            </a:r>
+          </a:p>
+          <a:p>
+            <a:r>
+              <a:rPr lang="pl-PL" dirty="0" smtClean="0"/>
+              <a:t>Obliczanie liczby pierwiastków w zadanym przedziale</a:t>
+            </a:r>
+          </a:p>
+          <a:p>
+            <a:r>
+              <a:rPr lang="pl-PL" dirty="0" smtClean="0"/>
+              <a:t>Eliminacja pierwiastków wielokrotnych</a:t>
+            </a:r>
+          </a:p>
+          <a:p>
+            <a:r>
+              <a:rPr lang="pl-PL" dirty="0" smtClean="0"/>
+              <a:t>Obliczanie pierwiastków w zadanym przedziale</a:t>
+            </a:r>
+          </a:p>
+          <a:p>
             <a:endParaRPr lang="pl-PL" dirty="0" smtClean="0"/>
-          </a:p>
-          <a:p>
-            <a:pPr>
-              <a:buFont typeface="Wingdings" panose="05000000000000000000" pitchFamily="2" charset="2"/>
-              <a:buChar char="ü"/>
-            </a:pPr>
-            <a:r>
-              <a:rPr lang="pl-PL" dirty="0" smtClean="0"/>
-              <a:t>Zastosowanie ciągu Sturma</a:t>
-            </a:r>
           </a:p>
         </p:txBody>
       </p:sp>
     </p:spTree>
     <p:extLst>
       <p:ext uri="{BB962C8B-B14F-4D97-AF65-F5344CB8AC3E}">
-        <p14:creationId xmlns:p14="http://schemas.microsoft.com/office/powerpoint/2010/main" val="2397709425"/>
+        <p14:creationId xmlns:p14="http://schemas.microsoft.com/office/powerpoint/2010/main" val="2872807545"/>
       </p:ext>
     </p:extLst>
   </p:cSld>
@@ -5172,13 +4327,13 @@
         <p:spPr/>
         <p:txBody>
           <a:bodyPr>
-            <a:normAutofit fontScale="90000"/>
+            <a:normAutofit/>
           </a:bodyPr>
           <a:lstStyle/>
           <a:p>
             <a:r>
               <a:rPr lang="pl-PL" dirty="0" smtClean="0"/>
-              <a:t>Dlaczego standardowe metody numeryczne odpadają ?</a:t>
+              <a:t>Kryterium oceny problemu</a:t>
             </a:r>
             <a:endParaRPr lang="pl-PL" dirty="0"/>
           </a:p>
@@ -5196,41 +4351,134 @@
         </p:nvSpPr>
         <p:spPr/>
         <p:txBody>
-          <a:bodyPr/>
-          <a:lstStyle/>
-          <a:p>
-            <a:r>
-              <a:rPr lang="pl-PL" dirty="0" smtClean="0"/>
-              <a:t>Wszystkie podstawowe metody numeryczne (bisekcji, stycznych, siecznych, reguła </a:t>
-            </a:r>
-            <a:r>
-              <a:rPr lang="pl-PL" dirty="0" err="1" smtClean="0"/>
-              <a:t>falsi</a:t>
-            </a:r>
-            <a:r>
-              <a:rPr lang="pl-PL" dirty="0" smtClean="0"/>
-              <a:t>) zakładają różny znak na końcach przedziału</a:t>
-            </a:r>
-          </a:p>
-          <a:p>
-            <a:r>
-              <a:rPr lang="pl-PL" dirty="0" smtClean="0"/>
-              <a:t>Potrzeba metody działającej, niezależnie od znaków na krańcach przedziału początkowego</a:t>
-            </a:r>
-          </a:p>
-          <a:p>
-            <a:r>
-              <a:rPr lang="pl-PL" dirty="0" smtClean="0"/>
-              <a:t>Potrzeba metody dobrze radzącej sobie z pierwiastkami wielokrotnymi</a:t>
-            </a:r>
-            <a:endParaRPr lang="pl-PL" dirty="0"/>
+          <a:bodyPr>
+            <a:normAutofit fontScale="85000" lnSpcReduction="10000"/>
+          </a:bodyPr>
+          <a:lstStyle/>
+          <a:p>
+            <a:pPr>
+              <a:buFontTx/>
+              <a:buChar char="-"/>
+            </a:pPr>
+            <a:r>
+              <a:rPr lang="pl-PL" sz="2800" dirty="0" smtClean="0"/>
+              <a:t>Poprawne parsowanie wielomianu w oparciu o strumień wejściowy podawany na kilka sposobów</a:t>
+            </a:r>
+          </a:p>
+          <a:p>
+            <a:pPr>
+              <a:buFontTx/>
+              <a:buChar char="-"/>
+            </a:pPr>
+            <a:r>
+              <a:rPr lang="pl-PL" sz="2800" dirty="0"/>
+              <a:t>Porównanie struktur reprezentujących </a:t>
+            </a:r>
+            <a:r>
+              <a:rPr lang="pl-PL" sz="2800" dirty="0" smtClean="0"/>
+              <a:t>wielomiany</a:t>
+            </a:r>
+          </a:p>
+          <a:p>
+            <a:pPr>
+              <a:buFontTx/>
+              <a:buChar char="-"/>
+            </a:pPr>
+            <a:r>
+              <a:rPr lang="pl-PL" sz="2800" dirty="0" smtClean="0"/>
+              <a:t>Wszystkie testy jednostkowe zakończone powodzeniem</a:t>
+            </a:r>
+            <a:r>
+              <a:rPr lang="pl-PL" sz="2800" dirty="0"/>
+              <a:t> </a:t>
+            </a:r>
+            <a:r>
+              <a:rPr lang="pl-PL" sz="2800" dirty="0" smtClean="0"/>
+              <a:t>dla obu struktur</a:t>
+            </a:r>
+          </a:p>
+          <a:p>
+            <a:pPr>
+              <a:buFontTx/>
+              <a:buChar char="-"/>
+            </a:pPr>
+            <a:r>
+              <a:rPr lang="pl-PL" sz="2800" dirty="0" smtClean="0"/>
+              <a:t>Porównanie wydajności obu struktur pod względem czasowym</a:t>
+            </a:r>
+            <a:r>
+              <a:rPr lang="pl-PL" sz="2800" dirty="0"/>
+              <a:t> </a:t>
+            </a:r>
+            <a:r>
+              <a:rPr lang="pl-PL" sz="2800" dirty="0" smtClean="0"/>
+              <a:t>dla różnych przypadków wielomianu wejściowego:</a:t>
+            </a:r>
+          </a:p>
+          <a:p>
+            <a:pPr lvl="1">
+              <a:buFont typeface="Wingdings" panose="05000000000000000000" pitchFamily="2" charset="2"/>
+              <a:buChar char="§"/>
+            </a:pPr>
+            <a:r>
+              <a:rPr lang="pl-PL" sz="2400" dirty="0" smtClean="0"/>
+              <a:t>Wysoki stopień wielomianu</a:t>
+            </a:r>
+          </a:p>
+          <a:p>
+            <a:pPr lvl="1">
+              <a:buFont typeface="Wingdings" panose="05000000000000000000" pitchFamily="2" charset="2"/>
+              <a:buChar char="§"/>
+            </a:pPr>
+            <a:r>
+              <a:rPr lang="pl-PL" sz="2400" dirty="0" smtClean="0"/>
+              <a:t>Wielomian gęsty</a:t>
+            </a:r>
+          </a:p>
+          <a:p>
+            <a:pPr lvl="1">
+              <a:buFont typeface="Wingdings" panose="05000000000000000000" pitchFamily="2" charset="2"/>
+              <a:buChar char="§"/>
+            </a:pPr>
+            <a:r>
+              <a:rPr lang="pl-PL" sz="2400" dirty="0" smtClean="0"/>
+              <a:t>Wielomian rzadki</a:t>
+            </a:r>
+          </a:p>
+          <a:p>
+            <a:pPr lvl="1">
+              <a:buFont typeface="Wingdings" panose="05000000000000000000" pitchFamily="2" charset="2"/>
+              <a:buChar char="§"/>
+            </a:pPr>
+            <a:r>
+              <a:rPr lang="pl-PL" sz="2400" dirty="0" smtClean="0"/>
+              <a:t>Wielomian </a:t>
+            </a:r>
+            <a:r>
+              <a:rPr lang="pl-PL" sz="2400" dirty="0" smtClean="0"/>
+              <a:t>nieposiadający </a:t>
+            </a:r>
+            <a:r>
+              <a:rPr lang="pl-PL" sz="2400" dirty="0" smtClean="0"/>
+              <a:t>pierwiastków</a:t>
+            </a:r>
+          </a:p>
+          <a:p>
+            <a:pPr lvl="1">
+              <a:buFont typeface="Wingdings" panose="05000000000000000000" pitchFamily="2" charset="2"/>
+              <a:buChar char="§"/>
+            </a:pPr>
+            <a:r>
+              <a:rPr lang="pl-PL" sz="2400" dirty="0" smtClean="0"/>
+              <a:t>Wielomian posiadający pierwiastki wielokrotne</a:t>
+            </a:r>
           </a:p>
         </p:txBody>
       </p:sp>
     </p:spTree>
     <p:extLst>
       <p:ext uri="{BB962C8B-B14F-4D97-AF65-F5344CB8AC3E}">
-        <p14:creationId xmlns:p14="http://schemas.microsoft.com/office/powerpoint/2010/main" val="3851097196"/>
+        <p14:creationId xmlns:p14="http://schemas.microsoft.com/office/powerpoint/2010/main" val="3322992260"/>
       </p:ext>
     </p:extLst>
   </p:cSld>

</xml_diff>